<commit_message>
Update session 8 documents.
</commit_message>
<xml_diff>
--- a/CPSC-24700/Presentations/session-08.pptx
+++ b/CPSC-24700/Presentations/session-08.pptx
@@ -208,7 +208,7 @@
           <a:p>
             <a:fld id="{1CF91C02-A59E-4778-8D4F-4840DBBEFA68}" type="datetimeFigureOut">
               <a:rPr lang="en-US" smtClean="0"/>
-              <a:t>9/13/2017</a:t>
+              <a:t>9/14/2017</a:t>
             </a:fld>
             <a:endParaRPr lang="en-US"/>
           </a:p>
@@ -720,16 +720,7 @@
           <a:bodyPr/>
           <a:lstStyle/>
           <a:p>
-            <a:r>
-              <a:rPr lang="en-US" sz="1000" dirty="0"/>
-              <a:t>Time check… we need to start our  Lab at 2:30.</a:t>
-            </a:r>
-          </a:p>
-          <a:p>
-            <a:r>
-              <a:rPr lang="en-US" sz="1000" dirty="0"/>
-              <a:t>Why have I changed the “Worldwide Web” to the “Internet”? By the end of this class it is your responsibility to know the difference.</a:t>
-            </a:r>
+            <a:endParaRPr lang="en-US" sz="1000" dirty="0"/>
           </a:p>
         </p:txBody>
       </p:sp>
@@ -1355,7 +1346,7 @@
           <a:p>
             <a:fld id="{5FB62F81-FD80-4AA8-93CA-E835B40BE667}" type="datetimeFigureOut">
               <a:rPr lang="en-US" smtClean="0"/>
-              <a:t>9/13/2017</a:t>
+              <a:t>9/14/2017</a:t>
             </a:fld>
             <a:endParaRPr lang="en-US"/>
           </a:p>
@@ -1553,7 +1544,7 @@
           <a:p>
             <a:fld id="{5FB62F81-FD80-4AA8-93CA-E835B40BE667}" type="datetimeFigureOut">
               <a:rPr lang="en-US" smtClean="0"/>
-              <a:t>9/13/2017</a:t>
+              <a:t>9/14/2017</a:t>
             </a:fld>
             <a:endParaRPr lang="en-US"/>
           </a:p>
@@ -1761,7 +1752,7 @@
           <a:p>
             <a:fld id="{5FB62F81-FD80-4AA8-93CA-E835B40BE667}" type="datetimeFigureOut">
               <a:rPr lang="en-US" smtClean="0"/>
-              <a:t>9/13/2017</a:t>
+              <a:t>9/14/2017</a:t>
             </a:fld>
             <a:endParaRPr lang="en-US"/>
           </a:p>
@@ -1959,7 +1950,7 @@
           <a:p>
             <a:fld id="{5FB62F81-FD80-4AA8-93CA-E835B40BE667}" type="datetimeFigureOut">
               <a:rPr lang="en-US" smtClean="0"/>
-              <a:t>9/13/2017</a:t>
+              <a:t>9/14/2017</a:t>
             </a:fld>
             <a:endParaRPr lang="en-US"/>
           </a:p>
@@ -2234,7 +2225,7 @@
           <a:p>
             <a:fld id="{5FB62F81-FD80-4AA8-93CA-E835B40BE667}" type="datetimeFigureOut">
               <a:rPr lang="en-US" smtClean="0"/>
-              <a:t>9/13/2017</a:t>
+              <a:t>9/14/2017</a:t>
             </a:fld>
             <a:endParaRPr lang="en-US"/>
           </a:p>
@@ -2499,7 +2490,7 @@
           <a:p>
             <a:fld id="{5FB62F81-FD80-4AA8-93CA-E835B40BE667}" type="datetimeFigureOut">
               <a:rPr lang="en-US" smtClean="0"/>
-              <a:t>9/13/2017</a:t>
+              <a:t>9/14/2017</a:t>
             </a:fld>
             <a:endParaRPr lang="en-US"/>
           </a:p>
@@ -2911,7 +2902,7 @@
           <a:p>
             <a:fld id="{5FB62F81-FD80-4AA8-93CA-E835B40BE667}" type="datetimeFigureOut">
               <a:rPr lang="en-US" smtClean="0"/>
-              <a:t>9/13/2017</a:t>
+              <a:t>9/14/2017</a:t>
             </a:fld>
             <a:endParaRPr lang="en-US"/>
           </a:p>
@@ -3052,7 +3043,7 @@
           <a:p>
             <a:fld id="{5FB62F81-FD80-4AA8-93CA-E835B40BE667}" type="datetimeFigureOut">
               <a:rPr lang="en-US" smtClean="0"/>
-              <a:t>9/13/2017</a:t>
+              <a:t>9/14/2017</a:t>
             </a:fld>
             <a:endParaRPr lang="en-US"/>
           </a:p>
@@ -3165,7 +3156,7 @@
           <a:p>
             <a:fld id="{5FB62F81-FD80-4AA8-93CA-E835B40BE667}" type="datetimeFigureOut">
               <a:rPr lang="en-US" smtClean="0"/>
-              <a:t>9/13/2017</a:t>
+              <a:t>9/14/2017</a:t>
             </a:fld>
             <a:endParaRPr lang="en-US"/>
           </a:p>
@@ -3476,7 +3467,7 @@
           <a:p>
             <a:fld id="{5FB62F81-FD80-4AA8-93CA-E835B40BE667}" type="datetimeFigureOut">
               <a:rPr lang="en-US" smtClean="0"/>
-              <a:t>9/13/2017</a:t>
+              <a:t>9/14/2017</a:t>
             </a:fld>
             <a:endParaRPr lang="en-US"/>
           </a:p>
@@ -3764,7 +3755,7 @@
           <a:p>
             <a:fld id="{5FB62F81-FD80-4AA8-93CA-E835B40BE667}" type="datetimeFigureOut">
               <a:rPr lang="en-US" smtClean="0"/>
-              <a:t>9/13/2017</a:t>
+              <a:t>9/14/2017</a:t>
             </a:fld>
             <a:endParaRPr lang="en-US"/>
           </a:p>
@@ -4005,7 +3996,7 @@
           <a:p>
             <a:fld id="{5FB62F81-FD80-4AA8-93CA-E835B40BE667}" type="datetimeFigureOut">
               <a:rPr lang="en-US" smtClean="0"/>
-              <a:t>9/13/2017</a:t>
+              <a:t>9/14/2017</a:t>
             </a:fld>
             <a:endParaRPr lang="en-US"/>
           </a:p>
@@ -4466,7 +4457,7 @@
             </a:br>
             <a:r>
               <a:rPr lang="en-US" sz="1800" dirty="0"/>
-              <a:t>Session: 7</a:t>
+              <a:t>Session: 8</a:t>
             </a:r>
           </a:p>
         </p:txBody>
@@ -4509,7 +4500,7 @@
             </a:pPr>
             <a:r>
               <a:rPr lang="en-US" sz="2000" dirty="0"/>
-              <a:t>Friendly Conversation &amp; Good Natured Banter…  TBD</a:t>
+              <a:t>Friendly Conversation &amp; Good Natured Banter…  Ryan?</a:t>
             </a:r>
           </a:p>
           <a:p>
@@ -4539,7 +4530,7 @@
             </a:pPr>
             <a:r>
               <a:rPr lang="en-US" sz="2000" dirty="0"/>
-              <a:t>Cascading Style Sheets (CSS)</a:t>
+              <a:t>Review Quiz 1 Results/Answers (~5 min)</a:t>
             </a:r>
           </a:p>
           <a:p>
@@ -4549,7 +4540,7 @@
             </a:pPr>
             <a:r>
               <a:rPr lang="en-US" sz="2000" dirty="0"/>
-              <a:t>Assignments and Pre-lab Wrap-up</a:t>
+              <a:t>Cascading Style Sheets (CSS)</a:t>
             </a:r>
           </a:p>
           <a:p>
@@ -4559,7 +4550,7 @@
             </a:pPr>
             <a:r>
               <a:rPr lang="en-US" sz="2000" dirty="0"/>
-              <a:t>Compare your Week 3 Lab implementation to the posted solution</a:t>
+              <a:t>Assignments and Pre-lab Wrap-up</a:t>
             </a:r>
           </a:p>
           <a:p>
@@ -4569,7 +4560,7 @@
             </a:pPr>
             <a:r>
               <a:rPr lang="en-US" sz="2000" dirty="0"/>
-              <a:t>Deploy Assignment #1 to our “test” environment</a:t>
+              <a:t>Deploy Project 1 to “test”</a:t>
             </a:r>
           </a:p>
           <a:p>
@@ -4928,7 +4919,7 @@
           <a:p>
             <a:r>
               <a:rPr lang="en-US" sz="2000" dirty="0"/>
-              <a:t>Complete Ch.3 of Sebesta</a:t>
+              <a:t>Finish Project 1</a:t>
             </a:r>
           </a:p>
         </p:txBody>
@@ -5033,6 +5024,7 @@
               <a:rPr lang="en-US" sz="2000" u="sng" dirty="0"/>
               <a:t>Wrap-up: </a:t>
             </a:r>
+            <a:endParaRPr lang="en-US" sz="2000" dirty="0"/>
           </a:p>
           <a:p>
             <a:pPr marL="0" indent="0">
@@ -5043,9 +5035,8 @@
             </a:pPr>
             <a:r>
               <a:rPr lang="en-US" sz="2000" dirty="0"/>
-              <a:t>Quiz 1 comments</a:t>
-            </a:r>
-            <a:endParaRPr lang="en-US" sz="2000" b="1" i="1" u="sng" dirty="0"/>
+              <a:t>Project 1 due next Wednesday… submit it early</a:t>
+            </a:r>
           </a:p>
           <a:p>
             <a:pPr marL="0" indent="0">
@@ -5056,7 +5047,7 @@
             </a:pPr>
             <a:r>
               <a:rPr lang="en-US" sz="2000" dirty="0"/>
-              <a:t>Project 1 due next Wednesday… submit it early</a:t>
+              <a:t>Quiz 2 available and due Wed, Sep 27 (a little less than two weeks)</a:t>
             </a:r>
           </a:p>
         </p:txBody>

</xml_diff>

<commit_message>
Update index.html and session-08.pptx.
</commit_message>
<xml_diff>
--- a/CPSC-24700/Presentations/session-08.pptx
+++ b/CPSC-24700/Presentations/session-08.pptx
@@ -207,7 +207,7 @@
           <a:p>
             <a:fld id="{1CF91C02-A59E-4778-8D4F-4840DBBEFA68}" type="datetimeFigureOut">
               <a:rPr lang="en-US" smtClean="0"/>
-              <a:t>9/15/2017</a:t>
+              <a:t>9/18/2017</a:t>
             </a:fld>
             <a:endParaRPr lang="en-US"/>
           </a:p>
@@ -1253,7 +1253,7 @@
           <a:p>
             <a:fld id="{5FB62F81-FD80-4AA8-93CA-E835B40BE667}" type="datetimeFigureOut">
               <a:rPr lang="en-US" smtClean="0"/>
-              <a:t>9/15/2017</a:t>
+              <a:t>9/18/2017</a:t>
             </a:fld>
             <a:endParaRPr lang="en-US"/>
           </a:p>
@@ -1451,7 +1451,7 @@
           <a:p>
             <a:fld id="{5FB62F81-FD80-4AA8-93CA-E835B40BE667}" type="datetimeFigureOut">
               <a:rPr lang="en-US" smtClean="0"/>
-              <a:t>9/15/2017</a:t>
+              <a:t>9/18/2017</a:t>
             </a:fld>
             <a:endParaRPr lang="en-US"/>
           </a:p>
@@ -1659,7 +1659,7 @@
           <a:p>
             <a:fld id="{5FB62F81-FD80-4AA8-93CA-E835B40BE667}" type="datetimeFigureOut">
               <a:rPr lang="en-US" smtClean="0"/>
-              <a:t>9/15/2017</a:t>
+              <a:t>9/18/2017</a:t>
             </a:fld>
             <a:endParaRPr lang="en-US"/>
           </a:p>
@@ -1857,7 +1857,7 @@
           <a:p>
             <a:fld id="{5FB62F81-FD80-4AA8-93CA-E835B40BE667}" type="datetimeFigureOut">
               <a:rPr lang="en-US" smtClean="0"/>
-              <a:t>9/15/2017</a:t>
+              <a:t>9/18/2017</a:t>
             </a:fld>
             <a:endParaRPr lang="en-US"/>
           </a:p>
@@ -2132,7 +2132,7 @@
           <a:p>
             <a:fld id="{5FB62F81-FD80-4AA8-93CA-E835B40BE667}" type="datetimeFigureOut">
               <a:rPr lang="en-US" smtClean="0"/>
-              <a:t>9/15/2017</a:t>
+              <a:t>9/18/2017</a:t>
             </a:fld>
             <a:endParaRPr lang="en-US"/>
           </a:p>
@@ -2397,7 +2397,7 @@
           <a:p>
             <a:fld id="{5FB62F81-FD80-4AA8-93CA-E835B40BE667}" type="datetimeFigureOut">
               <a:rPr lang="en-US" smtClean="0"/>
-              <a:t>9/15/2017</a:t>
+              <a:t>9/18/2017</a:t>
             </a:fld>
             <a:endParaRPr lang="en-US"/>
           </a:p>
@@ -2809,7 +2809,7 @@
           <a:p>
             <a:fld id="{5FB62F81-FD80-4AA8-93CA-E835B40BE667}" type="datetimeFigureOut">
               <a:rPr lang="en-US" smtClean="0"/>
-              <a:t>9/15/2017</a:t>
+              <a:t>9/18/2017</a:t>
             </a:fld>
             <a:endParaRPr lang="en-US"/>
           </a:p>
@@ -2950,7 +2950,7 @@
           <a:p>
             <a:fld id="{5FB62F81-FD80-4AA8-93CA-E835B40BE667}" type="datetimeFigureOut">
               <a:rPr lang="en-US" smtClean="0"/>
-              <a:t>9/15/2017</a:t>
+              <a:t>9/18/2017</a:t>
             </a:fld>
             <a:endParaRPr lang="en-US"/>
           </a:p>
@@ -3063,7 +3063,7 @@
           <a:p>
             <a:fld id="{5FB62F81-FD80-4AA8-93CA-E835B40BE667}" type="datetimeFigureOut">
               <a:rPr lang="en-US" smtClean="0"/>
-              <a:t>9/15/2017</a:t>
+              <a:t>9/18/2017</a:t>
             </a:fld>
             <a:endParaRPr lang="en-US"/>
           </a:p>
@@ -3374,7 +3374,7 @@
           <a:p>
             <a:fld id="{5FB62F81-FD80-4AA8-93CA-E835B40BE667}" type="datetimeFigureOut">
               <a:rPr lang="en-US" smtClean="0"/>
-              <a:t>9/15/2017</a:t>
+              <a:t>9/18/2017</a:t>
             </a:fld>
             <a:endParaRPr lang="en-US"/>
           </a:p>
@@ -3662,7 +3662,7 @@
           <a:p>
             <a:fld id="{5FB62F81-FD80-4AA8-93CA-E835B40BE667}" type="datetimeFigureOut">
               <a:rPr lang="en-US" smtClean="0"/>
-              <a:t>9/15/2017</a:t>
+              <a:t>9/18/2017</a:t>
             </a:fld>
             <a:endParaRPr lang="en-US"/>
           </a:p>
@@ -3903,7 +3903,7 @@
           <a:p>
             <a:fld id="{5FB62F81-FD80-4AA8-93CA-E835B40BE667}" type="datetimeFigureOut">
               <a:rPr lang="en-US" smtClean="0"/>
-              <a:t>9/15/2017</a:t>
+              <a:t>9/18/2017</a:t>
             </a:fld>
             <a:endParaRPr lang="en-US"/>
           </a:p>
@@ -4417,7 +4417,7 @@
             </a:pPr>
             <a:r>
               <a:rPr lang="en-US" sz="2000" dirty="0"/>
-              <a:t>Review Assignments</a:t>
+              <a:t>Check in with Ivan &amp; Karl on Project 2 setting up a Website on Azure… thank you Ivan and Karl!</a:t>
             </a:r>
           </a:p>
           <a:p>
@@ -4427,17 +4427,7 @@
             </a:pPr>
             <a:r>
               <a:rPr lang="en-US" sz="2000" dirty="0"/>
-              <a:t>Check in with Ivan &amp; Karl on Project 2 setting up a Website on Azure… thank you Ivan and Karl!</a:t>
-            </a:r>
-          </a:p>
-          <a:p>
-            <a:pPr marL="457200" indent="-457200">
-              <a:buFont typeface="+mj-lt"/>
-              <a:buAutoNum type="arabicPeriod"/>
-            </a:pPr>
-            <a:r>
-              <a:rPr lang="en-US" sz="2000" dirty="0"/>
-              <a:t>Review Quiz 1 Results/Answers (~5 min)</a:t>
+              <a:t>Review Assignments and Quiz 1 Answers (~5 min)</a:t>
             </a:r>
           </a:p>
           <a:p>
@@ -4656,6 +4646,18 @@
             <a:r>
               <a:rPr lang="en-US" sz="2000" dirty="0"/>
               <a:t>Complete Ch.3 of Sebesta (CSS)</a:t>
+            </a:r>
+          </a:p>
+          <a:p>
+            <a:endParaRPr lang="en-US" sz="2000" dirty="0"/>
+          </a:p>
+          <a:p>
+            <a:pPr marL="0" indent="0">
+              <a:buNone/>
+            </a:pPr>
+            <a:r>
+              <a:rPr lang="en-US" sz="2000" u="sng" dirty="0"/>
+              <a:t>Quiz 1 Answers</a:t>
             </a:r>
           </a:p>
         </p:txBody>

</xml_diff>